<commit_message>
updated mistake in lecture 8
</commit_message>
<xml_diff>
--- a/lecture-7-8/Lecture8_Mod.pptx
+++ b/lecture-7-8/Lecture8_Mod.pptx
@@ -160,7 +160,7 @@
   </p:defaultTextStyle>
   <p:extLst>
     <p:ext uri="{EFAFB233-063F-42B5-8137-9DF3F51BA10A}">
-      <p15:sldGuideLst xmlns:p15="http://schemas.microsoft.com/office/powerpoint/2012/main"/>
+      <p15:sldGuideLst xmlns:p15="http://schemas.microsoft.com/office/powerpoint/2012/main" xmlns=""/>
     </p:ext>
   </p:extLst>
 </p:presentation>
@@ -248,7 +248,7 @@
           <a:p>
             <a:fld id="{820A184C-AB42-BF49-8A7C-46FCBE0B735B}" type="datetimeFigureOut">
               <a:rPr lang="en-US" smtClean="0"/>
-              <a:t>10/20/16</a:t>
+              <a:t>10/25/16</a:t>
             </a:fld>
             <a:endParaRPr lang="en-US"/>
           </a:p>
@@ -2460,7 +2460,7 @@
           <a:p>
             <a:fld id="{5B881EC9-466B-E542-B616-287F00BF11E2}" type="datetimeFigureOut">
               <a:rPr lang="en-US" smtClean="0"/>
-              <a:t>10/20/16</a:t>
+              <a:t>10/25/16</a:t>
             </a:fld>
             <a:endParaRPr lang="en-US"/>
           </a:p>
@@ -2630,7 +2630,7 @@
           <a:p>
             <a:fld id="{5B881EC9-466B-E542-B616-287F00BF11E2}" type="datetimeFigureOut">
               <a:rPr lang="en-US" smtClean="0"/>
-              <a:t>10/20/16</a:t>
+              <a:t>10/25/16</a:t>
             </a:fld>
             <a:endParaRPr lang="en-US"/>
           </a:p>
@@ -2810,7 +2810,7 @@
           <a:p>
             <a:fld id="{5B881EC9-466B-E542-B616-287F00BF11E2}" type="datetimeFigureOut">
               <a:rPr lang="en-US" smtClean="0"/>
-              <a:t>10/20/16</a:t>
+              <a:t>10/25/16</a:t>
             </a:fld>
             <a:endParaRPr lang="en-US"/>
           </a:p>
@@ -3009,7 +3009,7 @@
                 </a:solidFill>
               </a:rPr>
               <a:pPr/>
-              <a:t>10/20/16</a:t>
+              <a:t>10/25/16</a:t>
             </a:fld>
             <a:endParaRPr lang="en-US">
               <a:solidFill>
@@ -3211,7 +3211,7 @@
                 </a:solidFill>
               </a:rPr>
               <a:pPr/>
-              <a:t>10/20/16</a:t>
+              <a:t>10/25/16</a:t>
             </a:fld>
             <a:endParaRPr lang="en-US">
               <a:solidFill>
@@ -3489,7 +3489,7 @@
                 </a:solidFill>
               </a:rPr>
               <a:pPr/>
-              <a:t>10/20/16</a:t>
+              <a:t>10/25/16</a:t>
             </a:fld>
             <a:endParaRPr lang="en-US">
               <a:solidFill>
@@ -3753,7 +3753,7 @@
                 </a:solidFill>
               </a:rPr>
               <a:pPr/>
-              <a:t>10/20/16</a:t>
+              <a:t>10/25/16</a:t>
             </a:fld>
             <a:endParaRPr lang="en-US">
               <a:solidFill>
@@ -4152,7 +4152,7 @@
                 </a:solidFill>
               </a:rPr>
               <a:pPr/>
-              <a:t>10/20/16</a:t>
+              <a:t>10/25/16</a:t>
             </a:fld>
             <a:endParaRPr lang="en-US">
               <a:solidFill>
@@ -4302,7 +4302,7 @@
                 </a:solidFill>
               </a:rPr>
               <a:pPr/>
-              <a:t>10/20/16</a:t>
+              <a:t>10/25/16</a:t>
             </a:fld>
             <a:endParaRPr lang="en-US">
               <a:solidFill>
@@ -4429,7 +4429,7 @@
                 </a:solidFill>
               </a:rPr>
               <a:pPr/>
-              <a:t>10/20/16</a:t>
+              <a:t>10/25/16</a:t>
             </a:fld>
             <a:endParaRPr lang="en-US">
               <a:solidFill>
@@ -4738,7 +4738,7 @@
                 </a:solidFill>
               </a:rPr>
               <a:pPr/>
-              <a:t>10/20/16</a:t>
+              <a:t>10/25/16</a:t>
             </a:fld>
             <a:endParaRPr lang="en-US">
               <a:solidFill>
@@ -4933,7 +4933,7 @@
           <a:p>
             <a:fld id="{5B881EC9-466B-E542-B616-287F00BF11E2}" type="datetimeFigureOut">
               <a:rPr lang="en-US" smtClean="0"/>
-              <a:t>10/20/16</a:t>
+              <a:t>10/25/16</a:t>
             </a:fld>
             <a:endParaRPr lang="en-US"/>
           </a:p>
@@ -5193,7 +5193,7 @@
                 </a:solidFill>
               </a:rPr>
               <a:pPr/>
-              <a:t>10/20/16</a:t>
+              <a:t>10/25/16</a:t>
             </a:fld>
             <a:endParaRPr lang="en-US">
               <a:solidFill>
@@ -5395,7 +5395,7 @@
                 </a:solidFill>
               </a:rPr>
               <a:pPr/>
-              <a:t>10/20/16</a:t>
+              <a:t>10/25/16</a:t>
             </a:fld>
             <a:endParaRPr lang="en-US">
               <a:solidFill>
@@ -5607,7 +5607,7 @@
                 </a:solidFill>
               </a:rPr>
               <a:pPr/>
-              <a:t>10/20/16</a:t>
+              <a:t>10/25/16</a:t>
             </a:fld>
             <a:endParaRPr lang="en-US">
               <a:solidFill>
@@ -5878,7 +5878,7 @@
           <a:p>
             <a:fld id="{5B881EC9-466B-E542-B616-287F00BF11E2}" type="datetimeFigureOut">
               <a:rPr lang="en-US" smtClean="0"/>
-              <a:t>10/20/16</a:t>
+              <a:t>10/25/16</a:t>
             </a:fld>
             <a:endParaRPr lang="en-US"/>
           </a:p>
@@ -6110,7 +6110,7 @@
           <a:p>
             <a:fld id="{5B881EC9-466B-E542-B616-287F00BF11E2}" type="datetimeFigureOut">
               <a:rPr lang="en-US" smtClean="0"/>
-              <a:t>10/20/16</a:t>
+              <a:t>10/25/16</a:t>
             </a:fld>
             <a:endParaRPr lang="en-US"/>
           </a:p>
@@ -6477,7 +6477,7 @@
           <a:p>
             <a:fld id="{5B881EC9-466B-E542-B616-287F00BF11E2}" type="datetimeFigureOut">
               <a:rPr lang="en-US" smtClean="0"/>
-              <a:t>10/20/16</a:t>
+              <a:t>10/25/16</a:t>
             </a:fld>
             <a:endParaRPr lang="en-US"/>
           </a:p>
@@ -6595,7 +6595,7 @@
           <a:p>
             <a:fld id="{5B881EC9-466B-E542-B616-287F00BF11E2}" type="datetimeFigureOut">
               <a:rPr lang="en-US" smtClean="0"/>
-              <a:t>10/20/16</a:t>
+              <a:t>10/25/16</a:t>
             </a:fld>
             <a:endParaRPr lang="en-US"/>
           </a:p>
@@ -6690,7 +6690,7 @@
           <a:p>
             <a:fld id="{5B881EC9-466B-E542-B616-287F00BF11E2}" type="datetimeFigureOut">
               <a:rPr lang="en-US" smtClean="0"/>
-              <a:t>10/20/16</a:t>
+              <a:t>10/25/16</a:t>
             </a:fld>
             <a:endParaRPr lang="en-US"/>
           </a:p>
@@ -6967,7 +6967,7 @@
           <a:p>
             <a:fld id="{5B881EC9-466B-E542-B616-287F00BF11E2}" type="datetimeFigureOut">
               <a:rPr lang="en-US" smtClean="0"/>
-              <a:t>10/20/16</a:t>
+              <a:t>10/25/16</a:t>
             </a:fld>
             <a:endParaRPr lang="en-US"/>
           </a:p>
@@ -7220,7 +7220,7 @@
           <a:p>
             <a:fld id="{5B881EC9-466B-E542-B616-287F00BF11E2}" type="datetimeFigureOut">
               <a:rPr lang="en-US" smtClean="0"/>
-              <a:t>10/20/16</a:t>
+              <a:t>10/25/16</a:t>
             </a:fld>
             <a:endParaRPr lang="en-US"/>
           </a:p>
@@ -7433,7 +7433,7 @@
           <a:p>
             <a:fld id="{5B881EC9-466B-E542-B616-287F00BF11E2}" type="datetimeFigureOut">
               <a:rPr lang="en-US" smtClean="0"/>
-              <a:t>10/20/16</a:t>
+              <a:t>10/25/16</a:t>
             </a:fld>
             <a:endParaRPr lang="en-US"/>
           </a:p>
@@ -7980,7 +7980,7 @@
                 </a:solidFill>
               </a:rPr>
               <a:pPr/>
-              <a:t>10/20/16</a:t>
+              <a:t>10/25/16</a:t>
             </a:fld>
             <a:endParaRPr lang="en-US">
               <a:solidFill>
@@ -8623,7 +8623,7 @@
   <p:timing>
     <p:tnLst>
       <p:par>
-        <p:cTn id="1" dur="indefinite" restart="never" nodeType="tmRoot"/>
+        <p:cTn xmlns:p14="http://schemas.microsoft.com/office/powerpoint/2010/main" id="1" dur="indefinite" restart="never" nodeType="tmRoot"/>
       </p:par>
     </p:tnLst>
   </p:timing>
@@ -9035,13 +9035,13 @@
   <p:clrMapOvr>
     <a:masterClrMapping/>
   </p:clrMapOvr>
-  <p:transition>
+  <p:transition xmlns:p14="http://schemas.microsoft.com/office/powerpoint/2010/main">
     <p:cut/>
   </p:transition>
   <p:timing>
     <p:tnLst>
       <p:par>
-        <p:cTn id="1" dur="indefinite" restart="never" nodeType="tmRoot">
+        <p:cTn xmlns:p14="http://schemas.microsoft.com/office/powerpoint/2010/main" id="1" dur="indefinite" restart="never" nodeType="tmRoot">
           <p:childTnLst>
             <p:seq concurrent="1" nextAc="seek">
               <p:cTn id="2" dur="indefinite" nodeType="mainSeq">
@@ -10380,7 +10380,7 @@
   <p:timing>
     <p:tnLst>
       <p:par>
-        <p:cTn id="1" dur="indefinite" restart="never" nodeType="tmRoot">
+        <p:cTn xmlns:p14="http://schemas.microsoft.com/office/powerpoint/2010/main" id="1" dur="indefinite" restart="never" nodeType="tmRoot">
           <p:childTnLst>
             <p:seq concurrent="1" nextAc="seek">
               <p:cTn id="2" dur="indefinite" nodeType="mainSeq">
@@ -11457,7 +11457,7 @@
   <p:timing>
     <p:tnLst>
       <p:par>
-        <p:cTn id="1" dur="indefinite" restart="never" nodeType="tmRoot">
+        <p:cTn xmlns:p14="http://schemas.microsoft.com/office/powerpoint/2010/main" id="1" dur="indefinite" restart="never" nodeType="tmRoot">
           <p:childTnLst>
             <p:seq concurrent="1" nextAc="seek">
               <p:cTn id="2" dur="indefinite" nodeType="mainSeq">
@@ -11664,11 +11664,7 @@
             </a:r>
             <a:r>
               <a:rPr lang="en-US" sz="3200" dirty="0" smtClean="0"/>
-              <a:t> </a:t>
-            </a:r>
-            <a:r>
-              <a:rPr lang="en-US" sz="3200" dirty="0" smtClean="0"/>
-              <a:t>between interleaved TXNs</a:t>
+              <a:t> between interleaved TXNs</a:t>
             </a:r>
           </a:p>
           <a:p>
@@ -11831,7 +11827,7 @@
   <p:timing>
     <p:tnLst>
       <p:par>
-        <p:cTn id="1" dur="indefinite" restart="never" nodeType="tmRoot">
+        <p:cTn xmlns:p14="http://schemas.microsoft.com/office/powerpoint/2010/main" id="1" dur="indefinite" restart="never" nodeType="tmRoot">
           <p:childTnLst>
             <p:seq concurrent="1" nextAc="seek">
               <p:cTn id="2" dur="indefinite" nodeType="mainSeq">
@@ -13114,16 +13110,7 @@
                 </a:solidFill>
                 <a:latin typeface="Calibri Light"/>
               </a:rPr>
-              <a:t>R</a:t>
-            </a:r>
-            <a:r>
-              <a:rPr lang="en-US" sz="2400" dirty="0" smtClean="0">
-                <a:solidFill>
-                  <a:prstClr val="black"/>
-                </a:solidFill>
-                <a:latin typeface="Calibri Light"/>
-              </a:rPr>
-              <a:t>eads </a:t>
+              <a:t>Reads </a:t>
             </a:r>
             <a:r>
               <a:rPr lang="en-US" sz="2400" dirty="0">
@@ -13269,7 +13256,7 @@
   <p:timing>
     <p:tnLst>
       <p:par>
-        <p:cTn id="1" dur="indefinite" restart="never" nodeType="tmRoot"/>
+        <p:cTn xmlns:p14="http://schemas.microsoft.com/office/powerpoint/2010/main" id="1" dur="indefinite" restart="never" nodeType="tmRoot"/>
       </p:par>
     </p:tnLst>
   </p:timing>
@@ -13774,7 +13761,7 @@
   <p:timing>
     <p:tnLst>
       <p:par>
-        <p:cTn id="1" dur="indefinite" restart="never" nodeType="tmRoot">
+        <p:cTn xmlns:p14="http://schemas.microsoft.com/office/powerpoint/2010/main" id="1" dur="indefinite" restart="never" nodeType="tmRoot">
           <p:childTnLst>
             <p:seq concurrent="1" nextAc="seek">
               <p:cTn id="2" dur="indefinite" nodeType="mainSeq">
@@ -15089,11 +15076,11 @@
   <p:clrMapOvr>
     <a:masterClrMapping/>
   </p:clrMapOvr>
-  <p:transition spd="slow"/>
+  <p:transition xmlns:p14="http://schemas.microsoft.com/office/powerpoint/2010/main" spd="slow"/>
   <p:timing>
     <p:tnLst>
       <p:par>
-        <p:cTn id="1" dur="indefinite" restart="never" nodeType="tmRoot">
+        <p:cTn xmlns:p14="http://schemas.microsoft.com/office/powerpoint/2010/main" id="1" dur="indefinite" restart="never" nodeType="tmRoot">
           <p:childTnLst>
             <p:seq concurrent="1" nextAc="seek">
               <p:cTn id="2" dur="indefinite" nodeType="mainSeq">
@@ -16299,11 +16286,11 @@
   <p:clrMapOvr>
     <a:masterClrMapping/>
   </p:clrMapOvr>
-  <p:transition spd="slow"/>
+  <p:transition xmlns:p14="http://schemas.microsoft.com/office/powerpoint/2010/main" spd="slow"/>
   <p:timing>
     <p:tnLst>
       <p:par>
-        <p:cTn id="1" dur="indefinite" restart="never" nodeType="tmRoot">
+        <p:cTn xmlns:p14="http://schemas.microsoft.com/office/powerpoint/2010/main" id="1" dur="indefinite" restart="never" nodeType="tmRoot">
           <p:childTnLst>
             <p:seq concurrent="1" nextAc="seek">
               <p:cTn id="2" dur="indefinite" nodeType="mainSeq">
@@ -17628,11 +17615,11 @@
   <p:clrMapOvr>
     <a:masterClrMapping/>
   </p:clrMapOvr>
-  <p:transition spd="slow"/>
+  <p:transition xmlns:p14="http://schemas.microsoft.com/office/powerpoint/2010/main" spd="slow"/>
   <p:timing>
     <p:tnLst>
       <p:par>
-        <p:cTn id="1" dur="indefinite" restart="never" nodeType="tmRoot">
+        <p:cTn xmlns:p14="http://schemas.microsoft.com/office/powerpoint/2010/main" id="1" dur="indefinite" restart="never" nodeType="tmRoot">
           <p:childTnLst>
             <p:seq concurrent="1" nextAc="seek">
               <p:cTn id="2" dur="indefinite" nodeType="mainSeq">
@@ -18551,7 +18538,25 @@
                 </a:solidFill>
                 <a:latin typeface="Calibri Light"/>
               </a:rPr>
-              <a:t> to B; now we have T</a:t>
+              <a:t> to B; now we </a:t>
+            </a:r>
+            <a:r>
+              <a:rPr lang="en-US" sz="2400">
+                <a:solidFill>
+                  <a:prstClr val="black"/>
+                </a:solidFill>
+                <a:latin typeface="Calibri Light"/>
+              </a:rPr>
+              <a:t>have </a:t>
+            </a:r>
+            <a:r>
+              <a:rPr lang="en-US" sz="2400" smtClean="0">
+                <a:solidFill>
+                  <a:prstClr val="black"/>
+                </a:solidFill>
+                <a:latin typeface="Calibri Light"/>
+              </a:rPr>
+              <a:t>T</a:t>
             </a:r>
             <a:r>
               <a:rPr lang="en-US" sz="2400" baseline="-25000" dirty="0">
@@ -18560,34 +18565,70 @@
                 </a:solidFill>
                 <a:latin typeface="Calibri Light"/>
               </a:rPr>
+              <a:t>1</a:t>
+            </a:r>
+            <a:r>
+              <a:rPr lang="en-US" sz="2400" smtClean="0">
+                <a:solidFill>
+                  <a:prstClr val="black"/>
+                </a:solidFill>
+                <a:latin typeface="Calibri Light"/>
+              </a:rPr>
+              <a:t>’s </a:t>
+            </a:r>
+            <a:r>
+              <a:rPr lang="en-US" sz="2400" dirty="0">
+                <a:solidFill>
+                  <a:prstClr val="black"/>
+                </a:solidFill>
+                <a:latin typeface="Calibri Light"/>
+              </a:rPr>
+              <a:t>value for B </a:t>
+            </a:r>
+            <a:r>
+              <a:rPr lang="en-US" sz="2400">
+                <a:solidFill>
+                  <a:prstClr val="black"/>
+                </a:solidFill>
+                <a:latin typeface="Calibri Light"/>
+              </a:rPr>
+              <a:t>and </a:t>
+            </a:r>
+            <a:r>
+              <a:rPr lang="en-US" sz="2400" smtClean="0">
+                <a:solidFill>
+                  <a:prstClr val="black"/>
+                </a:solidFill>
+                <a:latin typeface="Calibri Light"/>
+              </a:rPr>
+              <a:t>T</a:t>
+            </a:r>
+            <a:r>
+              <a:rPr lang="en-US" sz="2400" baseline="-25000" dirty="0">
+                <a:solidFill>
+                  <a:prstClr val="black"/>
+                </a:solidFill>
+                <a:latin typeface="Calibri Light"/>
+              </a:rPr>
               <a:t>2</a:t>
             </a:r>
             <a:r>
+              <a:rPr lang="en-US" sz="2400" smtClean="0">
+                <a:solidFill>
+                  <a:prstClr val="black"/>
+                </a:solidFill>
+                <a:latin typeface="Calibri Light"/>
+              </a:rPr>
+              <a:t>’s </a:t>
+            </a:r>
+            <a:r>
               <a:rPr lang="en-US" sz="2400" dirty="0">
                 <a:solidFill>
                   <a:prstClr val="black"/>
                 </a:solidFill>
                 <a:latin typeface="Calibri Light"/>
               </a:rPr>
-              <a:t>’s value for B and T</a:t>
-            </a:r>
-            <a:r>
-              <a:rPr lang="en-US" sz="2400" baseline="-25000" dirty="0">
-                <a:solidFill>
-                  <a:prstClr val="black"/>
-                </a:solidFill>
-                <a:latin typeface="Calibri Light"/>
-              </a:rPr>
-              <a:t>1</a:t>
-            </a:r>
-            <a:r>
-              <a:rPr lang="en-US" sz="2400" dirty="0">
-                <a:solidFill>
-                  <a:prstClr val="black"/>
-                </a:solidFill>
-                <a:latin typeface="Calibri Light"/>
-              </a:rPr>
-              <a:t>’s value for A-</a:t>
+              <a:t>value for A-</a:t>
             </a:r>
             <a:r>
               <a:rPr lang="en-US" sz="2400" i="1" dirty="0">
@@ -18976,11 +19017,11 @@
   <p:clrMapOvr>
     <a:masterClrMapping/>
   </p:clrMapOvr>
-  <p:transition spd="slow"/>
+  <p:transition xmlns:p14="http://schemas.microsoft.com/office/powerpoint/2010/main" spd="slow"/>
   <p:timing>
     <p:tnLst>
       <p:par>
-        <p:cTn id="1" dur="indefinite" restart="never" nodeType="tmRoot">
+        <p:cTn xmlns:p14="http://schemas.microsoft.com/office/powerpoint/2010/main" id="1" dur="indefinite" restart="never" nodeType="tmRoot">
           <p:childTnLst>
             <p:seq concurrent="1" nextAc="seek">
               <p:cTn id="2" dur="indefinite" nodeType="mainSeq">
@@ -19431,19 +19472,7 @@
                   </a:solidFill>
                   <a:latin typeface="+mj-lt"/>
                 </a:rPr>
-                <a:t>Lecture 8  &gt;  </a:t>
-              </a:r>
-              <a:r>
-                <a:rPr lang="en-US" sz="1400" b="1" i="1" dirty="0" smtClean="0">
-                  <a:solidFill>
-                    <a:schemeClr val="tx1">
-                      <a:lumMod val="65000"/>
-                      <a:lumOff val="35000"/>
-                    </a:schemeClr>
-                  </a:solidFill>
-                  <a:latin typeface="+mj-lt"/>
-                </a:rPr>
-                <a:t>Announcements</a:t>
+                <a:t>Lecture 8  &gt;  Announcements</a:t>
               </a:r>
               <a:endParaRPr lang="en-US" sz="1400" b="1" i="1" dirty="0">
                 <a:solidFill>
@@ -19580,13 +19609,13 @@
   <p:clrMapOvr>
     <a:masterClrMapping/>
   </p:clrMapOvr>
-  <p:transition>
+  <p:transition xmlns:p14="http://schemas.microsoft.com/office/powerpoint/2010/main">
     <p:cut/>
   </p:transition>
   <p:timing>
     <p:tnLst>
       <p:par>
-        <p:cTn id="1" dur="indefinite" restart="never" nodeType="tmRoot">
+        <p:cTn xmlns:p14="http://schemas.microsoft.com/office/powerpoint/2010/main" id="1" dur="indefinite" restart="never" nodeType="tmRoot">
           <p:childTnLst>
             <p:seq concurrent="1" nextAc="seek">
               <p:cTn id="2" dur="indefinite" nodeType="mainSeq">
@@ -20208,7 +20237,7 @@
   <p:timing>
     <p:tnLst>
       <p:par>
-        <p:cTn id="1" dur="indefinite" restart="never" nodeType="tmRoot"/>
+        <p:cTn xmlns:p14="http://schemas.microsoft.com/office/powerpoint/2010/main" id="1" dur="indefinite" restart="never" nodeType="tmRoot"/>
       </p:par>
     </p:tnLst>
   </p:timing>
@@ -20414,7 +20443,7 @@
   <p:timing>
     <p:tnLst>
       <p:par>
-        <p:cTn id="1" dur="indefinite" restart="never" nodeType="tmRoot"/>
+        <p:cTn xmlns:p14="http://schemas.microsoft.com/office/powerpoint/2010/main" id="1" dur="indefinite" restart="never" nodeType="tmRoot"/>
       </p:par>
     </p:tnLst>
   </p:timing>
@@ -20733,7 +20762,7 @@
   <p:timing>
     <p:tnLst>
       <p:par>
-        <p:cTn id="1" dur="indefinite" restart="never" nodeType="tmRoot">
+        <p:cTn xmlns:p14="http://schemas.microsoft.com/office/powerpoint/2010/main" id="1" dur="indefinite" restart="never" nodeType="tmRoot">
           <p:childTnLst>
             <p:seq concurrent="1" nextAc="seek">
               <p:cTn id="2" dur="indefinite" nodeType="mainSeq">
@@ -22420,7 +22449,7 @@
   <p:timing>
     <p:tnLst>
       <p:par>
-        <p:cTn id="1" dur="indefinite" restart="never" nodeType="tmRoot">
+        <p:cTn xmlns:p14="http://schemas.microsoft.com/office/powerpoint/2010/main" id="1" dur="indefinite" restart="never" nodeType="tmRoot">
           <p:childTnLst>
             <p:seq concurrent="1" nextAc="seek">
               <p:cTn id="2" dur="indefinite" nodeType="mainSeq">
@@ -24525,7 +24554,7 @@
   <p:timing>
     <p:tnLst>
       <p:par>
-        <p:cTn id="1" dur="indefinite" restart="never" nodeType="tmRoot">
+        <p:cTn xmlns:p14="http://schemas.microsoft.com/office/powerpoint/2010/main" id="1" dur="indefinite" restart="never" nodeType="tmRoot">
           <p:childTnLst>
             <p:seq concurrent="1" nextAc="seek">
               <p:cTn id="2" dur="indefinite" nodeType="mainSeq">
@@ -24925,13 +24954,13 @@
   <p:clrMapOvr>
     <a:masterClrMapping/>
   </p:clrMapOvr>
-  <p:transition>
+  <p:transition xmlns:p14="http://schemas.microsoft.com/office/powerpoint/2010/main">
     <p:cut/>
   </p:transition>
   <p:timing>
     <p:tnLst>
       <p:par>
-        <p:cTn id="1" dur="indefinite" restart="never" nodeType="tmRoot">
+        <p:cTn xmlns:p14="http://schemas.microsoft.com/office/powerpoint/2010/main" id="1" dur="indefinite" restart="never" nodeType="tmRoot">
           <p:childTnLst>
             <p:seq concurrent="1" nextAc="seek">
               <p:cTn id="2" dur="indefinite" nodeType="mainSeq">
@@ -26047,7 +26076,7 @@
   <p:timing>
     <p:tnLst>
       <p:par>
-        <p:cTn id="1" dur="indefinite" restart="never" nodeType="tmRoot"/>
+        <p:cTn xmlns:p14="http://schemas.microsoft.com/office/powerpoint/2010/main" id="1" dur="indefinite" restart="never" nodeType="tmRoot"/>
       </p:par>
     </p:tnLst>
   </p:timing>
@@ -27053,7 +27082,7 @@
   <p:timing>
     <p:tnLst>
       <p:par>
-        <p:cTn id="1" dur="indefinite" restart="never" nodeType="tmRoot"/>
+        <p:cTn xmlns:p14="http://schemas.microsoft.com/office/powerpoint/2010/main" id="1" dur="indefinite" restart="never" nodeType="tmRoot"/>
       </p:par>
     </p:tnLst>
   </p:timing>
@@ -27280,7 +27309,7 @@
                   <a:t>Conflict serializable </a:t>
                 </a:r>
                 <a14:m>
-                  <m:oMath xmlns:m="http://schemas.openxmlformats.org/officeDocument/2006/math">
+                  <m:oMath xmlns:m="http://schemas.openxmlformats.org/officeDocument/2006/math" xmlns="">
                     <m:r>
                       <a:rPr lang="en-US" sz="2800" b="1" i="1">
                         <a:solidFill>
@@ -27481,13 +27510,13 @@
   <p:clrMapOvr>
     <a:masterClrMapping/>
   </p:clrMapOvr>
-  <p:transition spd="slow">
+  <p:transition xmlns:p14="http://schemas.microsoft.com/office/powerpoint/2010/main" spd="slow">
     <p:cut/>
   </p:transition>
   <p:timing>
     <p:tnLst>
       <p:par>
-        <p:cTn id="1" dur="indefinite" restart="never" nodeType="tmRoot">
+        <p:cTn xmlns:p14="http://schemas.microsoft.com/office/powerpoint/2010/main" id="1" dur="indefinite" restart="never" nodeType="tmRoot">
           <p:childTnLst>
             <p:seq concurrent="1" nextAc="seek">
               <p:cTn id="2" dur="indefinite" nodeType="mainSeq">
@@ -30251,7 +30280,7 @@
   <p:timing>
     <p:tnLst>
       <p:par>
-        <p:cTn id="1" dur="indefinite" restart="never" nodeType="tmRoot">
+        <p:cTn xmlns:p14="http://schemas.microsoft.com/office/powerpoint/2010/main" id="1" dur="indefinite" restart="never" nodeType="tmRoot">
           <p:childTnLst>
             <p:seq concurrent="1" nextAc="seek">
               <p:cTn id="2" dur="indefinite" nodeType="mainSeq">
@@ -30771,13 +30800,13 @@
   <p:clrMapOvr>
     <a:masterClrMapping/>
   </p:clrMapOvr>
-  <p:transition>
+  <p:transition xmlns:p14="http://schemas.microsoft.com/office/powerpoint/2010/main">
     <p:cut/>
   </p:transition>
   <p:timing>
     <p:tnLst>
       <p:par>
-        <p:cTn id="1" dur="indefinite" restart="never" nodeType="tmRoot">
+        <p:cTn xmlns:p14="http://schemas.microsoft.com/office/powerpoint/2010/main" id="1" dur="indefinite" restart="never" nodeType="tmRoot">
           <p:childTnLst>
             <p:seq concurrent="1" nextAc="seek">
               <p:cTn id="2" dur="indefinite" nodeType="mainSeq">
@@ -31360,7 +31389,7 @@
   <p:timing>
     <p:tnLst>
       <p:par>
-        <p:cTn id="1" dur="indefinite" restart="never" nodeType="tmRoot"/>
+        <p:cTn xmlns:p14="http://schemas.microsoft.com/office/powerpoint/2010/main" id="1" dur="indefinite" restart="never" nodeType="tmRoot"/>
       </p:par>
     </p:tnLst>
   </p:timing>
@@ -32684,7 +32713,7 @@
   <p:timing>
     <p:tnLst>
       <p:par>
-        <p:cTn id="1" dur="indefinite" restart="never" nodeType="tmRoot"/>
+        <p:cTn xmlns:p14="http://schemas.microsoft.com/office/powerpoint/2010/main" id="1" dur="indefinite" restart="never" nodeType="tmRoot"/>
       </p:par>
     </p:tnLst>
   </p:timing>
@@ -35414,7 +35443,7 @@
   <p:timing>
     <p:tnLst>
       <p:par>
-        <p:cTn id="1" dur="indefinite" restart="never" nodeType="tmRoot">
+        <p:cTn xmlns:p14="http://schemas.microsoft.com/office/powerpoint/2010/main" id="1" dur="indefinite" restart="never" nodeType="tmRoot">
           <p:childTnLst>
             <p:seq concurrent="1" nextAc="seek">
               <p:cTn id="2" dur="indefinite" nodeType="mainSeq">
@@ -36866,7 +36895,7 @@
   <p:timing>
     <p:tnLst>
       <p:par>
-        <p:cTn id="1" dur="indefinite" restart="never" nodeType="tmRoot">
+        <p:cTn xmlns:p14="http://schemas.microsoft.com/office/powerpoint/2010/main" id="1" dur="indefinite" restart="never" nodeType="tmRoot">
           <p:childTnLst>
             <p:seq concurrent="1" nextAc="seek">
               <p:cTn id="2" dur="indefinite" nodeType="mainSeq">
@@ -37156,7 +37185,7 @@
   <p:timing>
     <p:tnLst>
       <p:par>
-        <p:cTn id="1" dur="indefinite" restart="never" nodeType="tmRoot"/>
+        <p:cTn xmlns:p14="http://schemas.microsoft.com/office/powerpoint/2010/main" id="1" dur="indefinite" restart="never" nodeType="tmRoot"/>
       </p:par>
     </p:tnLst>
   </p:timing>
@@ -37389,7 +37418,7 @@
   <p:timing>
     <p:tnLst>
       <p:par>
-        <p:cTn id="1" dur="indefinite" restart="never" nodeType="tmRoot"/>
+        <p:cTn xmlns:p14="http://schemas.microsoft.com/office/powerpoint/2010/main" id="1" dur="indefinite" restart="never" nodeType="tmRoot"/>
       </p:par>
     </p:tnLst>
   </p:timing>
@@ -37935,7 +37964,7 @@
   <p:timing>
     <p:tnLst>
       <p:par>
-        <p:cTn id="1" dur="indefinite" restart="never" nodeType="tmRoot">
+        <p:cTn xmlns:p14="http://schemas.microsoft.com/office/powerpoint/2010/main" id="1" dur="indefinite" restart="never" nodeType="tmRoot">
           <p:childTnLst>
             <p:seq concurrent="1" nextAc="seek">
               <p:cTn id="2" dur="indefinite" nodeType="mainSeq">
@@ -38587,7 +38616,7 @@
   <p:timing>
     <p:tnLst>
       <p:par>
-        <p:cTn id="1" dur="indefinite" restart="never" nodeType="tmRoot">
+        <p:cTn xmlns:p14="http://schemas.microsoft.com/office/powerpoint/2010/main" id="1" dur="indefinite" restart="never" nodeType="tmRoot">
           <p:childTnLst>
             <p:seq concurrent="1" nextAc="seek">
               <p:cTn id="2" dur="indefinite" nodeType="mainSeq">
@@ -38974,7 +39003,7 @@
   <p:timing>
     <p:tnLst>
       <p:par>
-        <p:cTn id="1" dur="indefinite" restart="never" nodeType="tmRoot">
+        <p:cTn xmlns:p14="http://schemas.microsoft.com/office/powerpoint/2010/main" id="1" dur="indefinite" restart="never" nodeType="tmRoot">
           <p:childTnLst>
             <p:seq concurrent="1" nextAc="seek">
               <p:cTn id="2" dur="indefinite" nodeType="mainSeq">
@@ -39279,7 +39308,7 @@
   <p:timing>
     <p:tnLst>
       <p:par>
-        <p:cTn id="1" dur="indefinite" restart="never" nodeType="tmRoot"/>
+        <p:cTn xmlns:p14="http://schemas.microsoft.com/office/powerpoint/2010/main" id="1" dur="indefinite" restart="never" nodeType="tmRoot"/>
       </p:par>
     </p:tnLst>
   </p:timing>
@@ -40020,13 +40049,13 @@
   <p:clrMapOvr>
     <a:masterClrMapping/>
   </p:clrMapOvr>
-  <p:transition>
+  <p:transition xmlns:p14="http://schemas.microsoft.com/office/powerpoint/2010/main">
     <p:cut/>
   </p:transition>
   <p:timing>
     <p:tnLst>
       <p:par>
-        <p:cTn id="1" dur="indefinite" restart="never" nodeType="tmRoot">
+        <p:cTn xmlns:p14="http://schemas.microsoft.com/office/powerpoint/2010/main" id="1" dur="indefinite" restart="never" nodeType="tmRoot">
           <p:childTnLst>
             <p:seq concurrent="1" nextAc="seek">
               <p:cTn id="2" dur="indefinite" nodeType="mainSeq">
@@ -40603,13 +40632,13 @@
   <p:clrMapOvr>
     <a:masterClrMapping/>
   </p:clrMapOvr>
-  <p:transition>
+  <p:transition xmlns:p14="http://schemas.microsoft.com/office/powerpoint/2010/main">
     <p:cut/>
   </p:transition>
   <p:timing>
     <p:tnLst>
       <p:par>
-        <p:cTn id="1" dur="indefinite" restart="never" nodeType="tmRoot">
+        <p:cTn xmlns:p14="http://schemas.microsoft.com/office/powerpoint/2010/main" id="1" dur="indefinite" restart="never" nodeType="tmRoot">
           <p:childTnLst>
             <p:seq concurrent="1" nextAc="seek">
               <p:cTn id="2" dur="indefinite" nodeType="mainSeq">
@@ -41578,7 +41607,7 @@
   <p:timing>
     <p:tnLst>
       <p:par>
-        <p:cTn id="1" dur="indefinite" restart="never" nodeType="tmRoot">
+        <p:cTn xmlns:p14="http://schemas.microsoft.com/office/powerpoint/2010/main" id="1" dur="indefinite" restart="never" nodeType="tmRoot">
           <p:childTnLst>
             <p:seq concurrent="1" nextAc="seek">
               <p:cTn id="2" dur="indefinite" nodeType="mainSeq">
@@ -42071,7 +42100,7 @@
                   <a:t>Therefore, Strict 2PL only allows conflict serializable </a:t>
                 </a:r>
                 <a14:m>
-                  <m:oMath xmlns:m="http://schemas.openxmlformats.org/officeDocument/2006/math">
+                  <m:oMath xmlns:m="http://schemas.openxmlformats.org/officeDocument/2006/math" xmlns="">
                     <m:r>
                       <a:rPr lang="en-US" sz="3200" i="1">
                         <a:solidFill>
@@ -42552,13 +42581,13 @@
   <p:clrMapOvr>
     <a:masterClrMapping/>
   </p:clrMapOvr>
-  <p:transition spd="slow">
+  <p:transition xmlns:p14="http://schemas.microsoft.com/office/powerpoint/2010/main" spd="slow">
     <p:cut/>
   </p:transition>
   <p:timing>
     <p:tnLst>
       <p:par>
-        <p:cTn id="1" dur="indefinite" restart="never" nodeType="tmRoot">
+        <p:cTn xmlns:p14="http://schemas.microsoft.com/office/powerpoint/2010/main" id="1" dur="indefinite" restart="never" nodeType="tmRoot">
           <p:childTnLst>
             <p:seq concurrent="1" nextAc="seek">
               <p:cTn id="2" dur="indefinite" nodeType="mainSeq">
@@ -42995,7 +43024,7 @@
   <p:timing>
     <p:tnLst>
       <p:par>
-        <p:cTn id="1" dur="indefinite" restart="never" nodeType="tmRoot">
+        <p:cTn xmlns:p14="http://schemas.microsoft.com/office/powerpoint/2010/main" id="1" dur="indefinite" restart="never" nodeType="tmRoot">
           <p:childTnLst>
             <p:seq concurrent="1" nextAc="seek">
               <p:cTn id="2" dur="indefinite" nodeType="mainSeq">
@@ -44098,13 +44127,13 @@
   <p:clrMapOvr>
     <a:masterClrMapping/>
   </p:clrMapOvr>
-  <p:transition spd="slow">
+  <p:transition xmlns:p14="http://schemas.microsoft.com/office/powerpoint/2010/main" spd="slow">
     <p:cut/>
   </p:transition>
   <p:timing>
     <p:tnLst>
       <p:par>
-        <p:cTn id="1" dur="indefinite" restart="never" nodeType="tmRoot"/>
+        <p:cTn xmlns:p14="http://schemas.microsoft.com/office/powerpoint/2010/main" id="1" dur="indefinite" restart="never" nodeType="tmRoot"/>
       </p:par>
     </p:tnLst>
   </p:timing>
@@ -45025,13 +45054,13 @@
   <p:clrMapOvr>
     <a:masterClrMapping/>
   </p:clrMapOvr>
-  <p:transition spd="slow">
+  <p:transition xmlns:p14="http://schemas.microsoft.com/office/powerpoint/2010/main" spd="slow">
     <p:cut/>
   </p:transition>
   <p:timing>
     <p:tnLst>
       <p:par>
-        <p:cTn id="1" dur="indefinite" restart="never" nodeType="tmRoot"/>
+        <p:cTn xmlns:p14="http://schemas.microsoft.com/office/powerpoint/2010/main" id="1" dur="indefinite" restart="never" nodeType="tmRoot"/>
       </p:par>
     </p:tnLst>
   </p:timing>
@@ -46215,13 +46244,13 @@
   <p:clrMapOvr>
     <a:masterClrMapping/>
   </p:clrMapOvr>
-  <p:transition spd="slow">
+  <p:transition xmlns:p14="http://schemas.microsoft.com/office/powerpoint/2010/main" spd="slow">
     <p:cut/>
   </p:transition>
   <p:timing>
     <p:tnLst>
       <p:par>
-        <p:cTn id="1" dur="indefinite" restart="never" nodeType="tmRoot"/>
+        <p:cTn xmlns:p14="http://schemas.microsoft.com/office/powerpoint/2010/main" id="1" dur="indefinite" restart="never" nodeType="tmRoot"/>
       </p:par>
     </p:tnLst>
   </p:timing>
@@ -47681,13 +47710,13 @@
   <p:clrMapOvr>
     <a:masterClrMapping/>
   </p:clrMapOvr>
-  <p:transition spd="slow">
+  <p:transition xmlns:p14="http://schemas.microsoft.com/office/powerpoint/2010/main" spd="slow">
     <p:cut/>
   </p:transition>
   <p:timing>
     <p:tnLst>
       <p:par>
-        <p:cTn id="1" dur="indefinite" restart="never" nodeType="tmRoot"/>
+        <p:cTn xmlns:p14="http://schemas.microsoft.com/office/powerpoint/2010/main" id="1" dur="indefinite" restart="never" nodeType="tmRoot"/>
       </p:par>
     </p:tnLst>
   </p:timing>
@@ -48335,7 +48364,7 @@
   <p:timing>
     <p:tnLst>
       <p:par>
-        <p:cTn id="1" dur="indefinite" restart="never" nodeType="tmRoot">
+        <p:cTn xmlns:p14="http://schemas.microsoft.com/office/powerpoint/2010/main" id="1" dur="indefinite" restart="never" nodeType="tmRoot">
           <p:childTnLst>
             <p:seq concurrent="1" nextAc="seek">
               <p:cTn id="2" dur="indefinite" nodeType="mainSeq">
@@ -48760,13 +48789,13 @@
   <p:clrMapOvr>
     <a:masterClrMapping/>
   </p:clrMapOvr>
-  <p:transition spd="slow">
+  <p:transition xmlns:p14="http://schemas.microsoft.com/office/powerpoint/2010/main" spd="slow">
     <p:cut/>
   </p:transition>
   <p:timing>
     <p:tnLst>
       <p:par>
-        <p:cTn id="1" dur="indefinite" restart="never" nodeType="tmRoot">
+        <p:cTn xmlns:p14="http://schemas.microsoft.com/office/powerpoint/2010/main" id="1" dur="indefinite" restart="never" nodeType="tmRoot">
           <p:childTnLst>
             <p:seq concurrent="1" nextAc="seek">
               <p:cTn id="2" dur="indefinite" nodeType="mainSeq">
@@ -49155,7 +49184,7 @@
         </p:nvGraphicFramePr>
         <p:xfrm>
           <a:off x="8587408" y="1027905"/>
-          <a:ext cx="3233531" cy="2465103"/>
+          <a:ext cx="3233531" cy="2465102"/>
         </p:xfrm>
         <a:graphic>
           <a:graphicData uri="http://schemas.openxmlformats.org/drawingml/2006/table">
@@ -49944,7 +49973,7 @@
   <p:timing>
     <p:tnLst>
       <p:par>
-        <p:cTn id="1" dur="indefinite" restart="never" nodeType="tmRoot">
+        <p:cTn xmlns:p14="http://schemas.microsoft.com/office/powerpoint/2010/main" id="1" dur="indefinite" restart="never" nodeType="tmRoot">
           <p:childTnLst>
             <p:seq concurrent="1" nextAc="seek">
               <p:cTn id="2" dur="indefinite" nodeType="mainSeq">
@@ -50683,13 +50712,13 @@
   <p:clrMapOvr>
     <a:masterClrMapping/>
   </p:clrMapOvr>
-  <p:transition spd="slow">
+  <p:transition xmlns:p14="http://schemas.microsoft.com/office/powerpoint/2010/main" spd="slow">
     <p:cut/>
   </p:transition>
   <p:timing>
     <p:tnLst>
       <p:par>
-        <p:cTn id="1" dur="indefinite" restart="never" nodeType="tmRoot">
+        <p:cTn xmlns:p14="http://schemas.microsoft.com/office/powerpoint/2010/main" id="1" dur="indefinite" restart="never" nodeType="tmRoot">
           <p:childTnLst>
             <p:seq concurrent="1" nextAc="seek">
               <p:cTn id="2" dur="indefinite" nodeType="mainSeq">
@@ -51192,7 +51221,7 @@
   <p:timing>
     <p:tnLst>
       <p:par>
-        <p:cTn id="1" dur="indefinite" restart="never" nodeType="tmRoot"/>
+        <p:cTn xmlns:p14="http://schemas.microsoft.com/office/powerpoint/2010/main" id="1" dur="indefinite" restart="never" nodeType="tmRoot"/>
       </p:par>
     </p:tnLst>
   </p:timing>
@@ -52488,7 +52517,7 @@
   <p:timing>
     <p:tnLst>
       <p:par>
-        <p:cTn id="1" dur="indefinite" restart="never" nodeType="tmRoot">
+        <p:cTn xmlns:p14="http://schemas.microsoft.com/office/powerpoint/2010/main" id="1" dur="indefinite" restart="never" nodeType="tmRoot">
           <p:childTnLst>
             <p:seq concurrent="1" nextAc="seek">
               <p:cTn id="2" dur="indefinite" nodeType="mainSeq">
@@ -54129,7 +54158,7 @@
   <p:timing>
     <p:tnLst>
       <p:par>
-        <p:cTn id="1" dur="indefinite" restart="never" nodeType="tmRoot">
+        <p:cTn xmlns:p14="http://schemas.microsoft.com/office/powerpoint/2010/main" id="1" dur="indefinite" restart="never" nodeType="tmRoot">
           <p:childTnLst>
             <p:seq concurrent="1" nextAc="seek">
               <p:cTn id="2" dur="indefinite" nodeType="mainSeq">
@@ -55825,7 +55854,7 @@
   <p:timing>
     <p:tnLst>
       <p:par>
-        <p:cTn id="1" dur="indefinite" restart="never" nodeType="tmRoot">
+        <p:cTn xmlns:p14="http://schemas.microsoft.com/office/powerpoint/2010/main" id="1" dur="indefinite" restart="never" nodeType="tmRoot">
           <p:childTnLst>
             <p:seq concurrent="1" nextAc="seek">
               <p:cTn id="2" dur="indefinite" nodeType="mainSeq">
@@ -56746,7 +56775,7 @@
   <p:timing>
     <p:tnLst>
       <p:par>
-        <p:cTn id="1" dur="indefinite" restart="never" nodeType="tmRoot">
+        <p:cTn xmlns:p14="http://schemas.microsoft.com/office/powerpoint/2010/main" id="1" dur="indefinite" restart="never" nodeType="tmRoot">
           <p:childTnLst>
             <p:seq concurrent="1" nextAc="seek">
               <p:cTn id="2" dur="indefinite" nodeType="mainSeq">
@@ -56894,7 +56923,7 @@
     </a:clrScheme>
     <a:fontScheme name="Office">
       <a:majorFont>
-        <a:latin typeface="Calibri Light" panose="020F0302020204030204"/>
+        <a:latin typeface="Calibri Light"/>
         <a:ea typeface=""/>
         <a:cs typeface=""/>
         <a:font script="Jpan" typeface="Yu Gothic Light"/>
@@ -56929,7 +56958,7 @@
         <a:font script="Geor" typeface="Sylfaen"/>
       </a:majorFont>
       <a:minorFont>
-        <a:latin typeface="Calibri" panose="020F0502020204030204"/>
+        <a:latin typeface="Calibri"/>
         <a:ea typeface=""/>
         <a:cs typeface=""/>
         <a:font script="Jpan" typeface="Yu Gothic"/>
@@ -57106,7 +57135,7 @@
   <a:extraClrSchemeLst/>
   <a:extLst>
     <a:ext uri="{05A4C25C-085E-4340-85A3-A5531E510DB2}">
-      <thm15:themeFamily xmlns:thm15="http://schemas.microsoft.com/office/thememl/2012/main" name="Office Theme" id="{62F939B6-93AF-4DB8-9C6B-D6C7DFDC589F}" vid="{4A3C46E8-61CC-4603-A589-7422A47A8E4A}"/>
+      <thm15:themeFamily xmlns:thm15="http://schemas.microsoft.com/office/thememl/2012/main" xmlns="" name="Office Theme" id="{62F939B6-93AF-4DB8-9C6B-D6C7DFDC589F}" vid="{4A3C46E8-61CC-4603-A589-7422A47A8E4A}"/>
     </a:ext>
   </a:extLst>
 </a:theme>
@@ -57367,7 +57396,7 @@
   <a:extraClrSchemeLst/>
   <a:extLst>
     <a:ext uri="{05A4C25C-085E-4340-85A3-A5531E510DB2}">
-      <thm15:themeFamily xmlns:thm15="http://schemas.microsoft.com/office/thememl/2012/main" name="Office Theme" id="{62F939B6-93AF-4DB8-9C6B-D6C7DFDC589F}" vid="{4A3C46E8-61CC-4603-A589-7422A47A8E4A}"/>
+      <thm15:themeFamily xmlns:thm15="http://schemas.microsoft.com/office/thememl/2012/main" xmlns="" name="Office Theme" id="{62F939B6-93AF-4DB8-9C6B-D6C7DFDC589F}" vid="{4A3C46E8-61CC-4603-A589-7422A47A8E4A}"/>
     </a:ext>
   </a:extLst>
 </a:theme>
@@ -57416,7 +57445,7 @@
     </a:clrScheme>
     <a:fontScheme name="Office">
       <a:majorFont>
-        <a:latin typeface="Calibri Light" panose="020F0302020204030204"/>
+        <a:latin typeface="Calibri Light"/>
         <a:ea typeface=""/>
         <a:cs typeface=""/>
         <a:font script="Jpan" typeface="Yu Gothic Light"/>
@@ -57451,7 +57480,7 @@
         <a:font script="Geor" typeface="Sylfaen"/>
       </a:majorFont>
       <a:minorFont>
-        <a:latin typeface="Calibri" panose="020F0502020204030204"/>
+        <a:latin typeface="Calibri"/>
         <a:ea typeface=""/>
         <a:cs typeface=""/>
         <a:font script="Jpan" typeface="Yu Gothic"/>
@@ -57628,7 +57657,7 @@
   <a:extraClrSchemeLst/>
   <a:extLst>
     <a:ext uri="{05A4C25C-085E-4340-85A3-A5531E510DB2}">
-      <thm15:themeFamily xmlns:thm15="http://schemas.microsoft.com/office/thememl/2012/main" name="Office Theme" id="{62F939B6-93AF-4DB8-9C6B-D6C7DFDC589F}" vid="{4A3C46E8-61CC-4603-A589-7422A47A8E4A}"/>
+      <thm15:themeFamily xmlns:thm15="http://schemas.microsoft.com/office/thememl/2012/main" xmlns="" name="Office Theme" id="{62F939B6-93AF-4DB8-9C6B-D6C7DFDC589F}" vid="{4A3C46E8-61CC-4603-A589-7422A47A8E4A}"/>
     </a:ext>
   </a:extLst>
 </a:theme>

</xml_diff>